<commit_message>
Adjusting demo slides after rerunning the fixed LSTM code
</commit_message>
<xml_diff>
--- a/Demo Slides.pptx
+++ b/Demo Slides.pptx
@@ -107,6 +107,11 @@
       </a:defRPr>
     </a:lvl9pPr>
   </p:defaultTextStyle>
+  <p:extLst>
+    <p:ext uri="{EFAFB233-063F-42B5-8137-9DF3F51BA10A}">
+      <p15:sldGuideLst xmlns:p15="http://schemas.microsoft.com/office/powerpoint/2012/main"/>
+    </p:ext>
+  </p:extLst>
 </p:presentation>
 </file>
 
@@ -1456,7 +1461,7 @@
           <a:p>
             <a:fld id="{17400A3A-D5B1-402B-8D67-09E0E8028817}" type="datetimeFigureOut">
               <a:rPr lang="en-US" smtClean="0"/>
-              <a:t>2020-11-30</a:t>
+              <a:t>2020-12-07</a:t>
             </a:fld>
             <a:endParaRPr lang="en-US"/>
           </a:p>
@@ -1752,7 +1757,7 @@
           <a:p>
             <a:fld id="{17400A3A-D5B1-402B-8D67-09E0E8028817}" type="datetimeFigureOut">
               <a:rPr lang="en-US" smtClean="0"/>
-              <a:t>2020-11-30</a:t>
+              <a:t>2020-12-07</a:t>
             </a:fld>
             <a:endParaRPr lang="en-US"/>
           </a:p>
@@ -2000,7 +2005,7 @@
           <a:p>
             <a:fld id="{17400A3A-D5B1-402B-8D67-09E0E8028817}" type="datetimeFigureOut">
               <a:rPr lang="en-US" smtClean="0"/>
-              <a:t>2020-11-30</a:t>
+              <a:t>2020-12-07</a:t>
             </a:fld>
             <a:endParaRPr lang="en-US"/>
           </a:p>
@@ -2540,7 +2545,7 @@
           <a:p>
             <a:fld id="{17400A3A-D5B1-402B-8D67-09E0E8028817}" type="datetimeFigureOut">
               <a:rPr lang="en-US" smtClean="0"/>
-              <a:t>2020-11-30</a:t>
+              <a:t>2020-12-07</a:t>
             </a:fld>
             <a:endParaRPr lang="en-US"/>
           </a:p>
@@ -2788,7 +2793,7 @@
           <a:p>
             <a:fld id="{17400A3A-D5B1-402B-8D67-09E0E8028817}" type="datetimeFigureOut">
               <a:rPr lang="en-US" smtClean="0"/>
-              <a:t>2020-11-30</a:t>
+              <a:t>2020-12-07</a:t>
             </a:fld>
             <a:endParaRPr lang="en-US"/>
           </a:p>
@@ -3320,7 +3325,7 @@
           <a:p>
             <a:fld id="{17400A3A-D5B1-402B-8D67-09E0E8028817}" type="datetimeFigureOut">
               <a:rPr lang="en-US" smtClean="0"/>
-              <a:t>2020-11-30</a:t>
+              <a:t>2020-12-07</a:t>
             </a:fld>
             <a:endParaRPr lang="en-US"/>
           </a:p>
@@ -3617,7 +3622,7 @@
           <a:p>
             <a:fld id="{17400A3A-D5B1-402B-8D67-09E0E8028817}" type="datetimeFigureOut">
               <a:rPr lang="en-US" smtClean="0"/>
-              <a:t>2020-11-30</a:t>
+              <a:t>2020-12-07</a:t>
             </a:fld>
             <a:endParaRPr lang="en-US"/>
           </a:p>
@@ -3791,7 +3796,7 @@
           <a:p>
             <a:fld id="{17400A3A-D5B1-402B-8D67-09E0E8028817}" type="datetimeFigureOut">
               <a:rPr lang="en-US" smtClean="0"/>
-              <a:t>2020-11-30</a:t>
+              <a:t>2020-12-07</a:t>
             </a:fld>
             <a:endParaRPr lang="en-US"/>
           </a:p>
@@ -3971,7 +3976,7 @@
           <a:p>
             <a:fld id="{17400A3A-D5B1-402B-8D67-09E0E8028817}" type="datetimeFigureOut">
               <a:rPr lang="en-US" smtClean="0"/>
-              <a:t>2020-11-30</a:t>
+              <a:t>2020-12-07</a:t>
             </a:fld>
             <a:endParaRPr lang="en-US"/>
           </a:p>
@@ -4141,7 +4146,7 @@
           <a:p>
             <a:fld id="{17400A3A-D5B1-402B-8D67-09E0E8028817}" type="datetimeFigureOut">
               <a:rPr lang="en-US" smtClean="0"/>
-              <a:t>2020-11-30</a:t>
+              <a:t>2020-12-07</a:t>
             </a:fld>
             <a:endParaRPr lang="en-US"/>
           </a:p>
@@ -4392,7 +4397,7 @@
           <a:p>
             <a:fld id="{17400A3A-D5B1-402B-8D67-09E0E8028817}" type="datetimeFigureOut">
               <a:rPr lang="en-US" smtClean="0"/>
-              <a:t>2020-11-30</a:t>
+              <a:t>2020-12-07</a:t>
             </a:fld>
             <a:endParaRPr lang="en-US"/>
           </a:p>
@@ -4689,7 +4694,7 @@
           <a:p>
             <a:fld id="{17400A3A-D5B1-402B-8D67-09E0E8028817}" type="datetimeFigureOut">
               <a:rPr lang="en-US" smtClean="0"/>
-              <a:t>2020-11-30</a:t>
+              <a:t>2020-12-07</a:t>
             </a:fld>
             <a:endParaRPr lang="en-US"/>
           </a:p>
@@ -5131,7 +5136,7 @@
           <a:p>
             <a:fld id="{17400A3A-D5B1-402B-8D67-09E0E8028817}" type="datetimeFigureOut">
               <a:rPr lang="en-US" smtClean="0"/>
-              <a:t>2020-11-30</a:t>
+              <a:t>2020-12-07</a:t>
             </a:fld>
             <a:endParaRPr lang="en-US"/>
           </a:p>
@@ -5249,7 +5254,7 @@
           <a:p>
             <a:fld id="{17400A3A-D5B1-402B-8D67-09E0E8028817}" type="datetimeFigureOut">
               <a:rPr lang="en-US" smtClean="0"/>
-              <a:t>2020-11-30</a:t>
+              <a:t>2020-12-07</a:t>
             </a:fld>
             <a:endParaRPr lang="en-US"/>
           </a:p>
@@ -5344,7 +5349,7 @@
           <a:p>
             <a:fld id="{17400A3A-D5B1-402B-8D67-09E0E8028817}" type="datetimeFigureOut">
               <a:rPr lang="en-US" smtClean="0"/>
-              <a:t>2020-11-30</a:t>
+              <a:t>2020-12-07</a:t>
             </a:fld>
             <a:endParaRPr lang="en-US"/>
           </a:p>
@@ -5627,7 +5632,7 @@
           <a:p>
             <a:fld id="{17400A3A-D5B1-402B-8D67-09E0E8028817}" type="datetimeFigureOut">
               <a:rPr lang="en-US" smtClean="0"/>
-              <a:t>2020-11-30</a:t>
+              <a:t>2020-12-07</a:t>
             </a:fld>
             <a:endParaRPr lang="en-US"/>
           </a:p>
@@ -5918,7 +5923,7 @@
           <a:p>
             <a:fld id="{17400A3A-D5B1-402B-8D67-09E0E8028817}" type="datetimeFigureOut">
               <a:rPr lang="en-US" smtClean="0"/>
-              <a:t>2020-11-30</a:t>
+              <a:t>2020-12-07</a:t>
             </a:fld>
             <a:endParaRPr lang="en-US"/>
           </a:p>
@@ -6448,7 +6453,7 @@
           <a:p>
             <a:fld id="{17400A3A-D5B1-402B-8D67-09E0E8028817}" type="datetimeFigureOut">
               <a:rPr lang="en-US" smtClean="0"/>
-              <a:t>2020-11-30</a:t>
+              <a:t>2020-12-07</a:t>
             </a:fld>
             <a:endParaRPr lang="en-US"/>
           </a:p>
@@ -7519,7 +7524,7 @@
           <p:nvPr>
             <p:extLst>
               <p:ext uri="{D42A27DB-BD31-4B8C-83A1-F6EECF244321}">
-                <p14:modId xmlns:p14="http://schemas.microsoft.com/office/powerpoint/2010/main" val="4047677188"/>
+                <p14:modId xmlns:p14="http://schemas.microsoft.com/office/powerpoint/2010/main" val="1633154149"/>
               </p:ext>
             </p:extLst>
           </p:nvPr>
@@ -8218,7 +8223,7 @@
                           <a:latin typeface="Arial" panose="020B0604020202020204" pitchFamily="34" charset="0"/>
                           <a:cs typeface="Arial" panose="020B0604020202020204" pitchFamily="34" charset="0"/>
                         </a:rPr>
-                        <a:t>0.6667</a:t>
+                        <a:t>0.6296</a:t>
                       </a:r>
                     </a:p>
                   </a:txBody>
@@ -8235,7 +8240,7 @@
                           <a:latin typeface="Arial" panose="020B0604020202020204" pitchFamily="34" charset="0"/>
                           <a:cs typeface="Arial" panose="020B0604020202020204" pitchFamily="34" charset="0"/>
                         </a:rPr>
-                        <a:t>0.6471</a:t>
+                        <a:t>0.6327</a:t>
                       </a:r>
                     </a:p>
                   </a:txBody>
@@ -8252,7 +8257,7 @@
                           <a:latin typeface="Arial" panose="020B0604020202020204" pitchFamily="34" charset="0"/>
                           <a:cs typeface="Arial" panose="020B0604020202020204" pitchFamily="34" charset="0"/>
                         </a:rPr>
-                        <a:t>0.3529</a:t>
+                        <a:t>0.6000</a:t>
                       </a:r>
                     </a:p>
                   </a:txBody>
@@ -8269,7 +8274,7 @@
                           <a:latin typeface="Arial" panose="020B0604020202020204" pitchFamily="34" charset="0"/>
                           <a:cs typeface="Arial" panose="020B0604020202020204" pitchFamily="34" charset="0"/>
                         </a:rPr>
-                        <a:t>1.0000</a:t>
+                        <a:t>0.9394</a:t>
                       </a:r>
                     </a:p>
                   </a:txBody>
@@ -8286,7 +8291,7 @@
                           <a:latin typeface="Arial" panose="020B0604020202020204" pitchFamily="34" charset="0"/>
                           <a:cs typeface="Arial" panose="020B0604020202020204" pitchFamily="34" charset="0"/>
                         </a:rPr>
-                        <a:t>0.8571</a:t>
+                        <a:t>0.1429</a:t>
                       </a:r>
                     </a:p>
                   </a:txBody>
@@ -8303,7 +8308,7 @@
                           <a:latin typeface="Arial" panose="020B0604020202020204" pitchFamily="34" charset="0"/>
                           <a:cs typeface="Arial" panose="020B0604020202020204" pitchFamily="34" charset="0"/>
                         </a:rPr>
-                        <a:t>0.7857</a:t>
+                        <a:t>0.7561</a:t>
                       </a:r>
                     </a:p>
                   </a:txBody>
@@ -8320,7 +8325,7 @@
                           <a:latin typeface="Arial" panose="020B0604020202020204" pitchFamily="34" charset="0"/>
                           <a:cs typeface="Arial" panose="020B0604020202020204" pitchFamily="34" charset="0"/>
                         </a:rPr>
-                        <a:t>0.5000</a:t>
+                        <a:t>0.2308</a:t>
                       </a:r>
                     </a:p>
                   </a:txBody>

</xml_diff>